<commit_message>
Updated US calibration using data naming scheme
</commit_message>
<xml_diff>
--- a/Docs/TransformHierarchy.pptx
+++ b/Docs/TransformHierarchy.pptx
@@ -6,6 +6,7 @@
   </p:sldMasterIdLst>
   <p:sldIdLst>
     <p:sldId id="256" r:id="rId2"/>
+    <p:sldId id="257" r:id="rId3"/>
   </p:sldIdLst>
   <p:sldSz cx="12192000" cy="6858000"/>
   <p:notesSz cx="6858000" cy="9144000"/>
@@ -269,7 +270,7 @@
           <a:p>
             <a:fld id="{F9B0A8D8-7851-4005-A77C-7B8836109314}" type="datetimeFigureOut">
               <a:rPr lang="en-CA" smtClean="0"/>
-              <a:t>2020-04-27</a:t>
+              <a:t>2020-06-01</a:t>
             </a:fld>
             <a:endParaRPr lang="en-CA"/>
           </a:p>
@@ -469,7 +470,7 @@
           <a:p>
             <a:fld id="{F9B0A8D8-7851-4005-A77C-7B8836109314}" type="datetimeFigureOut">
               <a:rPr lang="en-CA" smtClean="0"/>
-              <a:t>2020-04-27</a:t>
+              <a:t>2020-06-01</a:t>
             </a:fld>
             <a:endParaRPr lang="en-CA"/>
           </a:p>
@@ -679,7 +680,7 @@
           <a:p>
             <a:fld id="{F9B0A8D8-7851-4005-A77C-7B8836109314}" type="datetimeFigureOut">
               <a:rPr lang="en-CA" smtClean="0"/>
-              <a:t>2020-04-27</a:t>
+              <a:t>2020-06-01</a:t>
             </a:fld>
             <a:endParaRPr lang="en-CA"/>
           </a:p>
@@ -879,7 +880,7 @@
           <a:p>
             <a:fld id="{F9B0A8D8-7851-4005-A77C-7B8836109314}" type="datetimeFigureOut">
               <a:rPr lang="en-CA" smtClean="0"/>
-              <a:t>2020-04-27</a:t>
+              <a:t>2020-06-01</a:t>
             </a:fld>
             <a:endParaRPr lang="en-CA"/>
           </a:p>
@@ -1155,7 +1156,7 @@
           <a:p>
             <a:fld id="{F9B0A8D8-7851-4005-A77C-7B8836109314}" type="datetimeFigureOut">
               <a:rPr lang="en-CA" smtClean="0"/>
-              <a:t>2020-04-27</a:t>
+              <a:t>2020-06-01</a:t>
             </a:fld>
             <a:endParaRPr lang="en-CA"/>
           </a:p>
@@ -1423,7 +1424,7 @@
           <a:p>
             <a:fld id="{F9B0A8D8-7851-4005-A77C-7B8836109314}" type="datetimeFigureOut">
               <a:rPr lang="en-CA" smtClean="0"/>
-              <a:t>2020-04-27</a:t>
+              <a:t>2020-06-01</a:t>
             </a:fld>
             <a:endParaRPr lang="en-CA"/>
           </a:p>
@@ -1838,7 +1839,7 @@
           <a:p>
             <a:fld id="{F9B0A8D8-7851-4005-A77C-7B8836109314}" type="datetimeFigureOut">
               <a:rPr lang="en-CA" smtClean="0"/>
-              <a:t>2020-04-27</a:t>
+              <a:t>2020-06-01</a:t>
             </a:fld>
             <a:endParaRPr lang="en-CA"/>
           </a:p>
@@ -1980,7 +1981,7 @@
           <a:p>
             <a:fld id="{F9B0A8D8-7851-4005-A77C-7B8836109314}" type="datetimeFigureOut">
               <a:rPr lang="en-CA" smtClean="0"/>
-              <a:t>2020-04-27</a:t>
+              <a:t>2020-06-01</a:t>
             </a:fld>
             <a:endParaRPr lang="en-CA"/>
           </a:p>
@@ -2093,7 +2094,7 @@
           <a:p>
             <a:fld id="{F9B0A8D8-7851-4005-A77C-7B8836109314}" type="datetimeFigureOut">
               <a:rPr lang="en-CA" smtClean="0"/>
-              <a:t>2020-04-27</a:t>
+              <a:t>2020-06-01</a:t>
             </a:fld>
             <a:endParaRPr lang="en-CA"/>
           </a:p>
@@ -2406,7 +2407,7 @@
           <a:p>
             <a:fld id="{F9B0A8D8-7851-4005-A77C-7B8836109314}" type="datetimeFigureOut">
               <a:rPr lang="en-CA" smtClean="0"/>
-              <a:t>2020-04-27</a:t>
+              <a:t>2020-06-01</a:t>
             </a:fld>
             <a:endParaRPr lang="en-CA"/>
           </a:p>
@@ -2695,7 +2696,7 @@
           <a:p>
             <a:fld id="{F9B0A8D8-7851-4005-A77C-7B8836109314}" type="datetimeFigureOut">
               <a:rPr lang="en-CA" smtClean="0"/>
-              <a:t>2020-04-27</a:t>
+              <a:t>2020-06-01</a:t>
             </a:fld>
             <a:endParaRPr lang="en-CA"/>
           </a:p>
@@ -2938,7 +2939,7 @@
           <a:p>
             <a:fld id="{F9B0A8D8-7851-4005-A77C-7B8836109314}" type="datetimeFigureOut">
               <a:rPr lang="en-CA" smtClean="0"/>
-              <a:t>2020-04-27</a:t>
+              <a:t>2020-06-01</a:t>
             </a:fld>
             <a:endParaRPr lang="en-CA"/>
           </a:p>
@@ -4958,6 +4959,708 @@
 </p:sld>
 </file>
 
+<file path=ppt/slides/slide2.xml><?xml version="1.0" encoding="utf-8"?>
+<p:sld xmlns:a="http://schemas.openxmlformats.org/drawingml/2006/main" xmlns:r="http://schemas.openxmlformats.org/officeDocument/2006/relationships" xmlns:p="http://schemas.openxmlformats.org/presentationml/2006/main">
+  <p:cSld>
+    <p:spTree>
+      <p:nvGrpSpPr>
+        <p:cNvPr id="1" name=""/>
+        <p:cNvGrpSpPr/>
+        <p:nvPr/>
+      </p:nvGrpSpPr>
+      <p:grpSpPr>
+        <a:xfrm>
+          <a:off x="0" y="0"/>
+          <a:ext cx="0" cy="0"/>
+          <a:chOff x="0" y="0"/>
+          <a:chExt cx="0" cy="0"/>
+        </a:xfrm>
+      </p:grpSpPr>
+      <p:sp>
+        <p:nvSpPr>
+          <p:cNvPr id="4" name="TextBox 3">
+            <a:extLst>
+              <a:ext uri="{FF2B5EF4-FFF2-40B4-BE49-F238E27FC236}">
+                <a16:creationId xmlns:a16="http://schemas.microsoft.com/office/drawing/2014/main" id="{114B514F-E28C-4162-A0CD-F91A9BC5FA8E}"/>
+              </a:ext>
+            </a:extLst>
+          </p:cNvPr>
+          <p:cNvSpPr txBox="1"/>
+          <p:nvPr/>
+        </p:nvSpPr>
+        <p:spPr>
+          <a:xfrm>
+            <a:off x="4936178" y="2768234"/>
+            <a:ext cx="1185644" cy="369332"/>
+          </a:xfrm>
+          <a:prstGeom prst="rect">
+            <a:avLst/>
+          </a:prstGeom>
+          <a:noFill/>
+        </p:spPr>
+        <p:txBody>
+          <a:bodyPr wrap="square" rtlCol="0">
+            <a:spAutoFit/>
+          </a:bodyPr>
+          <a:lstStyle/>
+          <a:p>
+            <a:pPr algn="ctr"/>
+            <a:r>
+              <a:rPr lang="en-CA" b="1" dirty="0">
+                <a:solidFill>
+                  <a:sysClr val="windowText" lastClr="000000"/>
+                </a:solidFill>
+              </a:rPr>
+              <a:t>Table</a:t>
+            </a:r>
+          </a:p>
+        </p:txBody>
+      </p:sp>
+      <p:sp>
+        <p:nvSpPr>
+          <p:cNvPr id="6" name="TextBox 5">
+            <a:extLst>
+              <a:ext uri="{FF2B5EF4-FFF2-40B4-BE49-F238E27FC236}">
+                <a16:creationId xmlns:a16="http://schemas.microsoft.com/office/drawing/2014/main" id="{A4A7A25B-CB46-49A1-AC04-D945398D60B5}"/>
+              </a:ext>
+            </a:extLst>
+          </p:cNvPr>
+          <p:cNvSpPr txBox="1"/>
+          <p:nvPr/>
+        </p:nvSpPr>
+        <p:spPr>
+          <a:xfrm>
+            <a:off x="2783854" y="2768676"/>
+            <a:ext cx="1124124" cy="369332"/>
+          </a:xfrm>
+          <a:prstGeom prst="rect">
+            <a:avLst/>
+          </a:prstGeom>
+          <a:noFill/>
+        </p:spPr>
+        <p:txBody>
+          <a:bodyPr wrap="square" rtlCol="0">
+            <a:spAutoFit/>
+          </a:bodyPr>
+          <a:lstStyle/>
+          <a:p>
+            <a:pPr algn="ctr"/>
+            <a:r>
+              <a:rPr lang="en-CA" b="1" dirty="0">
+                <a:solidFill>
+                  <a:sysClr val="windowText" lastClr="000000"/>
+                </a:solidFill>
+              </a:rPr>
+              <a:t>MRI</a:t>
+            </a:r>
+          </a:p>
+        </p:txBody>
+      </p:sp>
+      <p:sp>
+        <p:nvSpPr>
+          <p:cNvPr id="7" name="TextBox 6">
+            <a:extLst>
+              <a:ext uri="{FF2B5EF4-FFF2-40B4-BE49-F238E27FC236}">
+                <a16:creationId xmlns:a16="http://schemas.microsoft.com/office/drawing/2014/main" id="{50B5DAE4-463C-4CBF-9645-CD4F5514DD49}"/>
+              </a:ext>
+            </a:extLst>
+          </p:cNvPr>
+          <p:cNvSpPr txBox="1"/>
+          <p:nvPr/>
+        </p:nvSpPr>
+        <p:spPr>
+          <a:xfrm>
+            <a:off x="305011" y="2768676"/>
+            <a:ext cx="1444413" cy="369332"/>
+          </a:xfrm>
+          <a:prstGeom prst="rect">
+            <a:avLst/>
+          </a:prstGeom>
+          <a:noFill/>
+        </p:spPr>
+        <p:txBody>
+          <a:bodyPr wrap="square" rtlCol="0">
+            <a:spAutoFit/>
+          </a:bodyPr>
+          <a:lstStyle/>
+          <a:p>
+            <a:pPr algn="ctr"/>
+            <a:r>
+              <a:rPr lang="en-CA" b="1" dirty="0">
+                <a:solidFill>
+                  <a:sysClr val="windowText" lastClr="000000"/>
+                </a:solidFill>
+              </a:rPr>
+              <a:t>MRI Image</a:t>
+            </a:r>
+          </a:p>
+        </p:txBody>
+      </p:sp>
+      <p:sp>
+        <p:nvSpPr>
+          <p:cNvPr id="10" name="TextBox 9">
+            <a:extLst>
+              <a:ext uri="{FF2B5EF4-FFF2-40B4-BE49-F238E27FC236}">
+                <a16:creationId xmlns:a16="http://schemas.microsoft.com/office/drawing/2014/main" id="{69912C88-BE0A-471A-AB61-E63B89109317}"/>
+              </a:ext>
+            </a:extLst>
+          </p:cNvPr>
+          <p:cNvSpPr txBox="1"/>
+          <p:nvPr/>
+        </p:nvSpPr>
+        <p:spPr>
+          <a:xfrm>
+            <a:off x="7150022" y="2768234"/>
+            <a:ext cx="1124124" cy="369332"/>
+          </a:xfrm>
+          <a:prstGeom prst="rect">
+            <a:avLst/>
+          </a:prstGeom>
+          <a:noFill/>
+        </p:spPr>
+        <p:txBody>
+          <a:bodyPr wrap="square" rtlCol="0">
+            <a:spAutoFit/>
+          </a:bodyPr>
+          <a:lstStyle/>
+          <a:p>
+            <a:pPr algn="ctr"/>
+            <a:r>
+              <a:rPr lang="en-CA" b="1" dirty="0">
+                <a:solidFill>
+                  <a:sysClr val="windowText" lastClr="000000"/>
+                </a:solidFill>
+              </a:rPr>
+              <a:t>US Probe</a:t>
+            </a:r>
+          </a:p>
+        </p:txBody>
+      </p:sp>
+      <p:sp>
+        <p:nvSpPr>
+          <p:cNvPr id="11" name="TextBox 10">
+            <a:extLst>
+              <a:ext uri="{FF2B5EF4-FFF2-40B4-BE49-F238E27FC236}">
+                <a16:creationId xmlns:a16="http://schemas.microsoft.com/office/drawing/2014/main" id="{51EC66F2-3F98-4CAD-81FF-4FEF3644EEA6}"/>
+              </a:ext>
+            </a:extLst>
+          </p:cNvPr>
+          <p:cNvSpPr txBox="1"/>
+          <p:nvPr/>
+        </p:nvSpPr>
+        <p:spPr>
+          <a:xfrm>
+            <a:off x="9302346" y="2768234"/>
+            <a:ext cx="1226191" cy="369332"/>
+          </a:xfrm>
+          <a:prstGeom prst="rect">
+            <a:avLst/>
+          </a:prstGeom>
+          <a:noFill/>
+        </p:spPr>
+        <p:txBody>
+          <a:bodyPr wrap="square" rtlCol="0">
+            <a:spAutoFit/>
+          </a:bodyPr>
+          <a:lstStyle/>
+          <a:p>
+            <a:pPr algn="ctr"/>
+            <a:r>
+              <a:rPr lang="en-CA" b="1" dirty="0">
+                <a:solidFill>
+                  <a:sysClr val="windowText" lastClr="000000"/>
+                </a:solidFill>
+              </a:rPr>
+              <a:t>US Image</a:t>
+            </a:r>
+          </a:p>
+        </p:txBody>
+      </p:sp>
+      <p:sp>
+        <p:nvSpPr>
+          <p:cNvPr id="18" name="TextBox 17">
+            <a:extLst>
+              <a:ext uri="{FF2B5EF4-FFF2-40B4-BE49-F238E27FC236}">
+                <a16:creationId xmlns:a16="http://schemas.microsoft.com/office/drawing/2014/main" id="{5F356F8B-CAA1-4849-8738-F5AF571A2A2B}"/>
+              </a:ext>
+            </a:extLst>
+          </p:cNvPr>
+          <p:cNvSpPr txBox="1"/>
+          <p:nvPr/>
+        </p:nvSpPr>
+        <p:spPr>
+          <a:xfrm>
+            <a:off x="4086902" y="3311858"/>
+            <a:ext cx="478173" cy="246221"/>
+          </a:xfrm>
+          <a:prstGeom prst="rect">
+            <a:avLst/>
+          </a:prstGeom>
+          <a:noFill/>
+        </p:spPr>
+        <p:txBody>
+          <a:bodyPr wrap="square" rtlCol="0">
+            <a:spAutoFit/>
+          </a:bodyPr>
+          <a:lstStyle/>
+          <a:p>
+            <a:pPr algn="ctr"/>
+            <a:r>
+              <a:rPr lang="en-CA" sz="1000" i="1" dirty="0">
+                <a:solidFill>
+                  <a:sysClr val="windowText" lastClr="000000"/>
+                </a:solidFill>
+              </a:rPr>
+              <a:t>Track</a:t>
+            </a:r>
+          </a:p>
+        </p:txBody>
+      </p:sp>
+      <p:sp>
+        <p:nvSpPr>
+          <p:cNvPr id="28" name="TextBox 27">
+            <a:extLst>
+              <a:ext uri="{FF2B5EF4-FFF2-40B4-BE49-F238E27FC236}">
+                <a16:creationId xmlns:a16="http://schemas.microsoft.com/office/drawing/2014/main" id="{75DD75FD-1C10-49BB-985E-380F8E44623D}"/>
+              </a:ext>
+            </a:extLst>
+          </p:cNvPr>
+          <p:cNvSpPr txBox="1"/>
+          <p:nvPr/>
+        </p:nvSpPr>
+        <p:spPr>
+          <a:xfrm>
+            <a:off x="6295856" y="3388095"/>
+            <a:ext cx="478173" cy="246221"/>
+          </a:xfrm>
+          <a:prstGeom prst="rect">
+            <a:avLst/>
+          </a:prstGeom>
+          <a:noFill/>
+        </p:spPr>
+        <p:txBody>
+          <a:bodyPr wrap="square" rtlCol="0">
+            <a:spAutoFit/>
+          </a:bodyPr>
+          <a:lstStyle/>
+          <a:p>
+            <a:pPr algn="ctr"/>
+            <a:r>
+              <a:rPr lang="en-CA" sz="1000" i="1" dirty="0">
+                <a:solidFill>
+                  <a:sysClr val="windowText" lastClr="000000"/>
+                </a:solidFill>
+              </a:rPr>
+              <a:t>Track</a:t>
+            </a:r>
+          </a:p>
+        </p:txBody>
+      </p:sp>
+      <p:sp>
+        <p:nvSpPr>
+          <p:cNvPr id="29" name="TextBox 28">
+            <a:extLst>
+              <a:ext uri="{FF2B5EF4-FFF2-40B4-BE49-F238E27FC236}">
+                <a16:creationId xmlns:a16="http://schemas.microsoft.com/office/drawing/2014/main" id="{73085F1A-9BCC-4518-969A-FC77BF2E7CB8}"/>
+              </a:ext>
+            </a:extLst>
+          </p:cNvPr>
+          <p:cNvSpPr txBox="1"/>
+          <p:nvPr/>
+        </p:nvSpPr>
+        <p:spPr>
+          <a:xfrm>
+            <a:off x="8498329" y="3363338"/>
+            <a:ext cx="687899" cy="246221"/>
+          </a:xfrm>
+          <a:prstGeom prst="rect">
+            <a:avLst/>
+          </a:prstGeom>
+          <a:noFill/>
+        </p:spPr>
+        <p:txBody>
+          <a:bodyPr wrap="square" rtlCol="0">
+            <a:spAutoFit/>
+          </a:bodyPr>
+          <a:lstStyle/>
+          <a:p>
+            <a:pPr algn="ctr"/>
+            <a:r>
+              <a:rPr lang="en-CA" sz="1000" i="1" dirty="0">
+                <a:solidFill>
+                  <a:sysClr val="windowText" lastClr="000000"/>
+                </a:solidFill>
+              </a:rPr>
+              <a:t>Calculate</a:t>
+            </a:r>
+          </a:p>
+        </p:txBody>
+      </p:sp>
+      <p:sp>
+        <p:nvSpPr>
+          <p:cNvPr id="35" name="TextBox 34">
+            <a:extLst>
+              <a:ext uri="{FF2B5EF4-FFF2-40B4-BE49-F238E27FC236}">
+                <a16:creationId xmlns:a16="http://schemas.microsoft.com/office/drawing/2014/main" id="{EBF3D362-26AA-4089-960A-E68636DBBF2F}"/>
+              </a:ext>
+            </a:extLst>
+          </p:cNvPr>
+          <p:cNvSpPr txBox="1"/>
+          <p:nvPr/>
+        </p:nvSpPr>
+        <p:spPr>
+          <a:xfrm>
+            <a:off x="3634716" y="3138008"/>
+            <a:ext cx="1370462" cy="276999"/>
+          </a:xfrm>
+          <a:prstGeom prst="rect">
+            <a:avLst/>
+          </a:prstGeom>
+          <a:noFill/>
+        </p:spPr>
+        <p:txBody>
+          <a:bodyPr wrap="square" rtlCol="0">
+            <a:spAutoFit/>
+          </a:bodyPr>
+          <a:lstStyle/>
+          <a:p>
+            <a:pPr algn="ctr"/>
+            <a:r>
+              <a:rPr lang="en-CA" sz="1200" dirty="0" err="1">
+                <a:solidFill>
+                  <a:sysClr val="windowText" lastClr="000000"/>
+                </a:solidFill>
+              </a:rPr>
+              <a:t>MRIToTable</a:t>
+            </a:r>
+            <a:endParaRPr lang="en-CA" sz="800" dirty="0">
+              <a:solidFill>
+                <a:sysClr val="windowText" lastClr="000000"/>
+              </a:solidFill>
+            </a:endParaRPr>
+          </a:p>
+        </p:txBody>
+      </p:sp>
+      <p:sp>
+        <p:nvSpPr>
+          <p:cNvPr id="37" name="TextBox 36">
+            <a:extLst>
+              <a:ext uri="{FF2B5EF4-FFF2-40B4-BE49-F238E27FC236}">
+                <a16:creationId xmlns:a16="http://schemas.microsoft.com/office/drawing/2014/main" id="{40ECD055-C863-4A1A-B209-4AA09998FFAD}"/>
+              </a:ext>
+            </a:extLst>
+          </p:cNvPr>
+          <p:cNvSpPr txBox="1"/>
+          <p:nvPr/>
+        </p:nvSpPr>
+        <p:spPr>
+          <a:xfrm>
+            <a:off x="5817466" y="3184584"/>
+            <a:ext cx="1434954" cy="276999"/>
+          </a:xfrm>
+          <a:prstGeom prst="rect">
+            <a:avLst/>
+          </a:prstGeom>
+          <a:noFill/>
+        </p:spPr>
+        <p:txBody>
+          <a:bodyPr wrap="square" rtlCol="0">
+            <a:spAutoFit/>
+          </a:bodyPr>
+          <a:lstStyle/>
+          <a:p>
+            <a:pPr algn="ctr"/>
+            <a:r>
+              <a:rPr lang="en-CA" sz="1200" dirty="0" err="1">
+                <a:solidFill>
+                  <a:sysClr val="windowText" lastClr="000000"/>
+                </a:solidFill>
+              </a:rPr>
+              <a:t>ProbeToTable</a:t>
+            </a:r>
+            <a:endParaRPr lang="en-CA" sz="800" dirty="0">
+              <a:solidFill>
+                <a:sysClr val="windowText" lastClr="000000"/>
+              </a:solidFill>
+            </a:endParaRPr>
+          </a:p>
+        </p:txBody>
+      </p:sp>
+      <p:sp>
+        <p:nvSpPr>
+          <p:cNvPr id="38" name="TextBox 37">
+            <a:extLst>
+              <a:ext uri="{FF2B5EF4-FFF2-40B4-BE49-F238E27FC236}">
+                <a16:creationId xmlns:a16="http://schemas.microsoft.com/office/drawing/2014/main" id="{F59158BB-4297-431F-B0BA-3D340A5A3DB4}"/>
+              </a:ext>
+            </a:extLst>
+          </p:cNvPr>
+          <p:cNvSpPr txBox="1"/>
+          <p:nvPr/>
+        </p:nvSpPr>
+        <p:spPr>
+          <a:xfrm>
+            <a:off x="1569932" y="3137566"/>
+            <a:ext cx="1370462" cy="276999"/>
+          </a:xfrm>
+          <a:prstGeom prst="rect">
+            <a:avLst/>
+          </a:prstGeom>
+          <a:noFill/>
+        </p:spPr>
+        <p:txBody>
+          <a:bodyPr wrap="square" rtlCol="0">
+            <a:spAutoFit/>
+          </a:bodyPr>
+          <a:lstStyle/>
+          <a:p>
+            <a:pPr algn="ctr"/>
+            <a:r>
+              <a:rPr lang="en-CA" sz="1200" dirty="0" err="1">
+                <a:solidFill>
+                  <a:sysClr val="windowText" lastClr="000000"/>
+                </a:solidFill>
+              </a:rPr>
+              <a:t>ImageToMRI</a:t>
+            </a:r>
+            <a:endParaRPr lang="en-CA" sz="800" dirty="0">
+              <a:solidFill>
+                <a:sysClr val="windowText" lastClr="000000"/>
+              </a:solidFill>
+            </a:endParaRPr>
+          </a:p>
+        </p:txBody>
+      </p:sp>
+      <p:sp>
+        <p:nvSpPr>
+          <p:cNvPr id="40" name="TextBox 39">
+            <a:extLst>
+              <a:ext uri="{FF2B5EF4-FFF2-40B4-BE49-F238E27FC236}">
+                <a16:creationId xmlns:a16="http://schemas.microsoft.com/office/drawing/2014/main" id="{1DD4C9BB-FFD9-4AF1-B522-BFEF28354826}"/>
+              </a:ext>
+            </a:extLst>
+          </p:cNvPr>
+          <p:cNvSpPr txBox="1"/>
+          <p:nvPr/>
+        </p:nvSpPr>
+        <p:spPr>
+          <a:xfrm>
+            <a:off x="8274146" y="3138008"/>
+            <a:ext cx="1124119" cy="276999"/>
+          </a:xfrm>
+          <a:prstGeom prst="rect">
+            <a:avLst/>
+          </a:prstGeom>
+          <a:noFill/>
+        </p:spPr>
+        <p:txBody>
+          <a:bodyPr wrap="square" rtlCol="0">
+            <a:spAutoFit/>
+          </a:bodyPr>
+          <a:lstStyle/>
+          <a:p>
+            <a:pPr algn="ctr"/>
+            <a:r>
+              <a:rPr lang="en-CA" sz="1200" dirty="0" err="1">
+                <a:solidFill>
+                  <a:sysClr val="windowText" lastClr="000000"/>
+                </a:solidFill>
+              </a:rPr>
+              <a:t>USToProbe</a:t>
+            </a:r>
+            <a:endParaRPr lang="en-CA" sz="800" dirty="0">
+              <a:solidFill>
+                <a:sysClr val="windowText" lastClr="000000"/>
+              </a:solidFill>
+            </a:endParaRPr>
+          </a:p>
+        </p:txBody>
+      </p:sp>
+      <p:cxnSp>
+        <p:nvCxnSpPr>
+          <p:cNvPr id="45" name="Straight Arrow Connector 44">
+            <a:extLst>
+              <a:ext uri="{FF2B5EF4-FFF2-40B4-BE49-F238E27FC236}">
+                <a16:creationId xmlns:a16="http://schemas.microsoft.com/office/drawing/2014/main" id="{D3D7AE82-5205-4439-8A90-93880ECD98A6}"/>
+              </a:ext>
+            </a:extLst>
+          </p:cNvPr>
+          <p:cNvCxnSpPr>
+            <a:cxnSpLocks/>
+            <a:stCxn id="7" idx="3"/>
+            <a:endCxn id="6" idx="1"/>
+          </p:cNvCxnSpPr>
+          <p:nvPr/>
+        </p:nvCxnSpPr>
+        <p:spPr>
+          <a:xfrm>
+            <a:off x="1749424" y="2953342"/>
+            <a:ext cx="1034430" cy="0"/>
+          </a:xfrm>
+          <a:prstGeom prst="straightConnector1">
+            <a:avLst/>
+          </a:prstGeom>
+          <a:ln>
+            <a:tailEnd type="triangle"/>
+          </a:ln>
+        </p:spPr>
+        <p:style>
+          <a:lnRef idx="1">
+            <a:schemeClr val="dk1"/>
+          </a:lnRef>
+          <a:fillRef idx="0">
+            <a:schemeClr val="dk1"/>
+          </a:fillRef>
+          <a:effectRef idx="0">
+            <a:schemeClr val="dk1"/>
+          </a:effectRef>
+          <a:fontRef idx="minor">
+            <a:schemeClr val="tx1"/>
+          </a:fontRef>
+        </p:style>
+      </p:cxnSp>
+      <p:cxnSp>
+        <p:nvCxnSpPr>
+          <p:cNvPr id="47" name="Straight Arrow Connector 46">
+            <a:extLst>
+              <a:ext uri="{FF2B5EF4-FFF2-40B4-BE49-F238E27FC236}">
+                <a16:creationId xmlns:a16="http://schemas.microsoft.com/office/drawing/2014/main" id="{D08689DF-B6ED-47B4-A9D2-3BE6D6F151F3}"/>
+              </a:ext>
+            </a:extLst>
+          </p:cNvPr>
+          <p:cNvCxnSpPr>
+            <a:cxnSpLocks/>
+            <a:stCxn id="6" idx="3"/>
+            <a:endCxn id="4" idx="1"/>
+          </p:cNvCxnSpPr>
+          <p:nvPr/>
+        </p:nvCxnSpPr>
+        <p:spPr>
+          <a:xfrm flipV="1">
+            <a:off x="3907978" y="2952900"/>
+            <a:ext cx="1028200" cy="442"/>
+          </a:xfrm>
+          <a:prstGeom prst="straightConnector1">
+            <a:avLst/>
+          </a:prstGeom>
+          <a:ln>
+            <a:tailEnd type="triangle"/>
+          </a:ln>
+        </p:spPr>
+        <p:style>
+          <a:lnRef idx="1">
+            <a:schemeClr val="dk1"/>
+          </a:lnRef>
+          <a:fillRef idx="0">
+            <a:schemeClr val="dk1"/>
+          </a:fillRef>
+          <a:effectRef idx="0">
+            <a:schemeClr val="dk1"/>
+          </a:effectRef>
+          <a:fontRef idx="minor">
+            <a:schemeClr val="tx1"/>
+          </a:fontRef>
+        </p:style>
+      </p:cxnSp>
+      <p:cxnSp>
+        <p:nvCxnSpPr>
+          <p:cNvPr id="48" name="Straight Arrow Connector 47">
+            <a:extLst>
+              <a:ext uri="{FF2B5EF4-FFF2-40B4-BE49-F238E27FC236}">
+                <a16:creationId xmlns:a16="http://schemas.microsoft.com/office/drawing/2014/main" id="{D1F2832B-917A-4E82-A260-E467E01FE729}"/>
+              </a:ext>
+            </a:extLst>
+          </p:cNvPr>
+          <p:cNvCxnSpPr>
+            <a:cxnSpLocks/>
+            <a:stCxn id="4" idx="3"/>
+            <a:endCxn id="10" idx="1"/>
+          </p:cNvCxnSpPr>
+          <p:nvPr/>
+        </p:nvCxnSpPr>
+        <p:spPr>
+          <a:xfrm>
+            <a:off x="6121822" y="2952900"/>
+            <a:ext cx="1028200" cy="0"/>
+          </a:xfrm>
+          <a:prstGeom prst="straightConnector1">
+            <a:avLst/>
+          </a:prstGeom>
+          <a:ln>
+            <a:tailEnd type="triangle"/>
+          </a:ln>
+        </p:spPr>
+        <p:style>
+          <a:lnRef idx="1">
+            <a:schemeClr val="dk1"/>
+          </a:lnRef>
+          <a:fillRef idx="0">
+            <a:schemeClr val="dk1"/>
+          </a:fillRef>
+          <a:effectRef idx="0">
+            <a:schemeClr val="dk1"/>
+          </a:effectRef>
+          <a:fontRef idx="minor">
+            <a:schemeClr val="tx1"/>
+          </a:fontRef>
+        </p:style>
+      </p:cxnSp>
+      <p:cxnSp>
+        <p:nvCxnSpPr>
+          <p:cNvPr id="49" name="Straight Arrow Connector 48">
+            <a:extLst>
+              <a:ext uri="{FF2B5EF4-FFF2-40B4-BE49-F238E27FC236}">
+                <a16:creationId xmlns:a16="http://schemas.microsoft.com/office/drawing/2014/main" id="{FE3FD518-FCD0-4C2C-834C-2CCCCAEAB169}"/>
+              </a:ext>
+            </a:extLst>
+          </p:cNvPr>
+          <p:cNvCxnSpPr>
+            <a:cxnSpLocks/>
+            <a:stCxn id="10" idx="3"/>
+            <a:endCxn id="11" idx="1"/>
+          </p:cNvCxnSpPr>
+          <p:nvPr/>
+        </p:nvCxnSpPr>
+        <p:spPr>
+          <a:xfrm>
+            <a:off x="8274146" y="2952900"/>
+            <a:ext cx="1028200" cy="0"/>
+          </a:xfrm>
+          <a:prstGeom prst="straightConnector1">
+            <a:avLst/>
+          </a:prstGeom>
+          <a:ln>
+            <a:tailEnd type="triangle"/>
+          </a:ln>
+        </p:spPr>
+        <p:style>
+          <a:lnRef idx="1">
+            <a:schemeClr val="dk1"/>
+          </a:lnRef>
+          <a:fillRef idx="0">
+            <a:schemeClr val="dk1"/>
+          </a:fillRef>
+          <a:effectRef idx="0">
+            <a:schemeClr val="dk1"/>
+          </a:effectRef>
+          <a:fontRef idx="minor">
+            <a:schemeClr val="tx1"/>
+          </a:fontRef>
+        </p:style>
+      </p:cxnSp>
+    </p:spTree>
+    <p:extLst>
+      <p:ext uri="{BB962C8B-B14F-4D97-AF65-F5344CB8AC3E}">
+        <p14:creationId xmlns:p14="http://schemas.microsoft.com/office/powerpoint/2010/main" val="915958141"/>
+      </p:ext>
+    </p:extLst>
+  </p:cSld>
+  <p:clrMapOvr>
+    <a:masterClrMapping/>
+  </p:clrMapOvr>
+</p:sld>
+</file>
+
 <file path=ppt/theme/theme1.xml><?xml version="1.0" encoding="utf-8"?>
 <a:theme xmlns:a="http://schemas.openxmlformats.org/drawingml/2006/main" name="Office Theme">
   <a:themeElements>

</xml_diff>

<commit_message>
Working US Probe calibration
</commit_message>
<xml_diff>
--- a/Docs/TransformHierarchy.pptx
+++ b/Docs/TransformHierarchy.pptx
@@ -270,7 +270,7 @@
           <a:p>
             <a:fld id="{F9B0A8D8-7851-4005-A77C-7B8836109314}" type="datetimeFigureOut">
               <a:rPr lang="en-CA" smtClean="0"/>
-              <a:t>2020-06-01</a:t>
+              <a:t>2020-06-08</a:t>
             </a:fld>
             <a:endParaRPr lang="en-CA"/>
           </a:p>
@@ -470,7 +470,7 @@
           <a:p>
             <a:fld id="{F9B0A8D8-7851-4005-A77C-7B8836109314}" type="datetimeFigureOut">
               <a:rPr lang="en-CA" smtClean="0"/>
-              <a:t>2020-06-01</a:t>
+              <a:t>2020-06-08</a:t>
             </a:fld>
             <a:endParaRPr lang="en-CA"/>
           </a:p>
@@ -680,7 +680,7 @@
           <a:p>
             <a:fld id="{F9B0A8D8-7851-4005-A77C-7B8836109314}" type="datetimeFigureOut">
               <a:rPr lang="en-CA" smtClean="0"/>
-              <a:t>2020-06-01</a:t>
+              <a:t>2020-06-08</a:t>
             </a:fld>
             <a:endParaRPr lang="en-CA"/>
           </a:p>
@@ -880,7 +880,7 @@
           <a:p>
             <a:fld id="{F9B0A8D8-7851-4005-A77C-7B8836109314}" type="datetimeFigureOut">
               <a:rPr lang="en-CA" smtClean="0"/>
-              <a:t>2020-06-01</a:t>
+              <a:t>2020-06-08</a:t>
             </a:fld>
             <a:endParaRPr lang="en-CA"/>
           </a:p>
@@ -1156,7 +1156,7 @@
           <a:p>
             <a:fld id="{F9B0A8D8-7851-4005-A77C-7B8836109314}" type="datetimeFigureOut">
               <a:rPr lang="en-CA" smtClean="0"/>
-              <a:t>2020-06-01</a:t>
+              <a:t>2020-06-08</a:t>
             </a:fld>
             <a:endParaRPr lang="en-CA"/>
           </a:p>
@@ -1424,7 +1424,7 @@
           <a:p>
             <a:fld id="{F9B0A8D8-7851-4005-A77C-7B8836109314}" type="datetimeFigureOut">
               <a:rPr lang="en-CA" smtClean="0"/>
-              <a:t>2020-06-01</a:t>
+              <a:t>2020-06-08</a:t>
             </a:fld>
             <a:endParaRPr lang="en-CA"/>
           </a:p>
@@ -1839,7 +1839,7 @@
           <a:p>
             <a:fld id="{F9B0A8D8-7851-4005-A77C-7B8836109314}" type="datetimeFigureOut">
               <a:rPr lang="en-CA" smtClean="0"/>
-              <a:t>2020-06-01</a:t>
+              <a:t>2020-06-08</a:t>
             </a:fld>
             <a:endParaRPr lang="en-CA"/>
           </a:p>
@@ -1981,7 +1981,7 @@
           <a:p>
             <a:fld id="{F9B0A8D8-7851-4005-A77C-7B8836109314}" type="datetimeFigureOut">
               <a:rPr lang="en-CA" smtClean="0"/>
-              <a:t>2020-06-01</a:t>
+              <a:t>2020-06-08</a:t>
             </a:fld>
             <a:endParaRPr lang="en-CA"/>
           </a:p>
@@ -2094,7 +2094,7 @@
           <a:p>
             <a:fld id="{F9B0A8D8-7851-4005-A77C-7B8836109314}" type="datetimeFigureOut">
               <a:rPr lang="en-CA" smtClean="0"/>
-              <a:t>2020-06-01</a:t>
+              <a:t>2020-06-08</a:t>
             </a:fld>
             <a:endParaRPr lang="en-CA"/>
           </a:p>
@@ -2407,7 +2407,7 @@
           <a:p>
             <a:fld id="{F9B0A8D8-7851-4005-A77C-7B8836109314}" type="datetimeFigureOut">
               <a:rPr lang="en-CA" smtClean="0"/>
-              <a:t>2020-06-01</a:t>
+              <a:t>2020-06-08</a:t>
             </a:fld>
             <a:endParaRPr lang="en-CA"/>
           </a:p>
@@ -2696,7 +2696,7 @@
           <a:p>
             <a:fld id="{F9B0A8D8-7851-4005-A77C-7B8836109314}" type="datetimeFigureOut">
               <a:rPr lang="en-CA" smtClean="0"/>
-              <a:t>2020-06-01</a:t>
+              <a:t>2020-06-08</a:t>
             </a:fld>
             <a:endParaRPr lang="en-CA"/>
           </a:p>
@@ -2939,7 +2939,7 @@
           <a:p>
             <a:fld id="{F9B0A8D8-7851-4005-A77C-7B8836109314}" type="datetimeFigureOut">
               <a:rPr lang="en-CA" smtClean="0"/>
-              <a:t>2020-06-01</a:t>
+              <a:t>2020-06-08</a:t>
             </a:fld>
             <a:endParaRPr lang="en-CA"/>
           </a:p>
@@ -5291,7 +5291,7 @@
                   <a:sysClr val="windowText" lastClr="000000"/>
                 </a:solidFill>
               </a:rPr>
-              <a:t>Calculate</a:t>
+              <a:t>Calibrate</a:t>
             </a:r>
           </a:p>
         </p:txBody>
@@ -5648,6 +5648,46 @@
           </a:fontRef>
         </p:style>
       </p:cxnSp>
+      <p:sp>
+        <p:nvSpPr>
+          <p:cNvPr id="19" name="TextBox 18">
+            <a:extLst>
+              <a:ext uri="{FF2B5EF4-FFF2-40B4-BE49-F238E27FC236}">
+                <a16:creationId xmlns:a16="http://schemas.microsoft.com/office/drawing/2014/main" id="{01B9C63E-F1A3-4DCD-8416-9FBA23345C3C}"/>
+              </a:ext>
+            </a:extLst>
+          </p:cNvPr>
+          <p:cNvSpPr txBox="1"/>
+          <p:nvPr/>
+        </p:nvSpPr>
+        <p:spPr>
+          <a:xfrm>
+            <a:off x="1858901" y="3352567"/>
+            <a:ext cx="787089" cy="246221"/>
+          </a:xfrm>
+          <a:prstGeom prst="rect">
+            <a:avLst/>
+          </a:prstGeom>
+          <a:noFill/>
+        </p:spPr>
+        <p:txBody>
+          <a:bodyPr wrap="square" rtlCol="0">
+            <a:spAutoFit/>
+          </a:bodyPr>
+          <a:lstStyle/>
+          <a:p>
+            <a:pPr algn="ctr"/>
+            <a:r>
+              <a:rPr lang="en-CA" sz="1000" i="1" dirty="0">
+                <a:solidFill>
+                  <a:sysClr val="windowText" lastClr="000000"/>
+                </a:solidFill>
+              </a:rPr>
+              <a:t>Calibrated</a:t>
+            </a:r>
+          </a:p>
+        </p:txBody>
+      </p:sp>
     </p:spTree>
     <p:extLst>
       <p:ext uri="{BB962C8B-B14F-4D97-AF65-F5344CB8AC3E}">

</xml_diff>

<commit_message>
* New module called AbdominalBiopsyNavigation to integrate existing functionality with use of param node and init funcs - will delete LiverBiopsy module when new module is confirmed to function without error
</commit_message>
<xml_diff>
--- a/Docs/TransformHierarchy.pptx
+++ b/Docs/TransformHierarchy.pptx
@@ -7,6 +7,7 @@
   <p:sldIdLst>
     <p:sldId id="256" r:id="rId2"/>
     <p:sldId id="257" r:id="rId3"/>
+    <p:sldId id="258" r:id="rId4"/>
   </p:sldIdLst>
   <p:sldSz cx="12192000" cy="6858000"/>
   <p:notesSz cx="6858000" cy="9144000"/>
@@ -270,7 +271,7 @@
           <a:p>
             <a:fld id="{F9B0A8D8-7851-4005-A77C-7B8836109314}" type="datetimeFigureOut">
               <a:rPr lang="en-CA" smtClean="0"/>
-              <a:t>2020-06-08</a:t>
+              <a:t>2020-07-13</a:t>
             </a:fld>
             <a:endParaRPr lang="en-CA"/>
           </a:p>
@@ -470,7 +471,7 @@
           <a:p>
             <a:fld id="{F9B0A8D8-7851-4005-A77C-7B8836109314}" type="datetimeFigureOut">
               <a:rPr lang="en-CA" smtClean="0"/>
-              <a:t>2020-06-08</a:t>
+              <a:t>2020-07-13</a:t>
             </a:fld>
             <a:endParaRPr lang="en-CA"/>
           </a:p>
@@ -680,7 +681,7 @@
           <a:p>
             <a:fld id="{F9B0A8D8-7851-4005-A77C-7B8836109314}" type="datetimeFigureOut">
               <a:rPr lang="en-CA" smtClean="0"/>
-              <a:t>2020-06-08</a:t>
+              <a:t>2020-07-13</a:t>
             </a:fld>
             <a:endParaRPr lang="en-CA"/>
           </a:p>
@@ -880,7 +881,7 @@
           <a:p>
             <a:fld id="{F9B0A8D8-7851-4005-A77C-7B8836109314}" type="datetimeFigureOut">
               <a:rPr lang="en-CA" smtClean="0"/>
-              <a:t>2020-06-08</a:t>
+              <a:t>2020-07-13</a:t>
             </a:fld>
             <a:endParaRPr lang="en-CA"/>
           </a:p>
@@ -1156,7 +1157,7 @@
           <a:p>
             <a:fld id="{F9B0A8D8-7851-4005-A77C-7B8836109314}" type="datetimeFigureOut">
               <a:rPr lang="en-CA" smtClean="0"/>
-              <a:t>2020-06-08</a:t>
+              <a:t>2020-07-13</a:t>
             </a:fld>
             <a:endParaRPr lang="en-CA"/>
           </a:p>
@@ -1424,7 +1425,7 @@
           <a:p>
             <a:fld id="{F9B0A8D8-7851-4005-A77C-7B8836109314}" type="datetimeFigureOut">
               <a:rPr lang="en-CA" smtClean="0"/>
-              <a:t>2020-06-08</a:t>
+              <a:t>2020-07-13</a:t>
             </a:fld>
             <a:endParaRPr lang="en-CA"/>
           </a:p>
@@ -1839,7 +1840,7 @@
           <a:p>
             <a:fld id="{F9B0A8D8-7851-4005-A77C-7B8836109314}" type="datetimeFigureOut">
               <a:rPr lang="en-CA" smtClean="0"/>
-              <a:t>2020-06-08</a:t>
+              <a:t>2020-07-13</a:t>
             </a:fld>
             <a:endParaRPr lang="en-CA"/>
           </a:p>
@@ -1981,7 +1982,7 @@
           <a:p>
             <a:fld id="{F9B0A8D8-7851-4005-A77C-7B8836109314}" type="datetimeFigureOut">
               <a:rPr lang="en-CA" smtClean="0"/>
-              <a:t>2020-06-08</a:t>
+              <a:t>2020-07-13</a:t>
             </a:fld>
             <a:endParaRPr lang="en-CA"/>
           </a:p>
@@ -2094,7 +2095,7 @@
           <a:p>
             <a:fld id="{F9B0A8D8-7851-4005-A77C-7B8836109314}" type="datetimeFigureOut">
               <a:rPr lang="en-CA" smtClean="0"/>
-              <a:t>2020-06-08</a:t>
+              <a:t>2020-07-13</a:t>
             </a:fld>
             <a:endParaRPr lang="en-CA"/>
           </a:p>
@@ -2407,7 +2408,7 @@
           <a:p>
             <a:fld id="{F9B0A8D8-7851-4005-A77C-7B8836109314}" type="datetimeFigureOut">
               <a:rPr lang="en-CA" smtClean="0"/>
-              <a:t>2020-06-08</a:t>
+              <a:t>2020-07-13</a:t>
             </a:fld>
             <a:endParaRPr lang="en-CA"/>
           </a:p>
@@ -2696,7 +2697,7 @@
           <a:p>
             <a:fld id="{F9B0A8D8-7851-4005-A77C-7B8836109314}" type="datetimeFigureOut">
               <a:rPr lang="en-CA" smtClean="0"/>
-              <a:t>2020-06-08</a:t>
+              <a:t>2020-07-13</a:t>
             </a:fld>
             <a:endParaRPr lang="en-CA"/>
           </a:p>
@@ -2939,7 +2940,7 @@
           <a:p>
             <a:fld id="{F9B0A8D8-7851-4005-A77C-7B8836109314}" type="datetimeFigureOut">
               <a:rPr lang="en-CA" smtClean="0"/>
-              <a:t>2020-06-08</a:t>
+              <a:t>2020-07-13</a:t>
             </a:fld>
             <a:endParaRPr lang="en-CA"/>
           </a:p>
@@ -5701,6 +5702,431 @@
 </p:sld>
 </file>
 
+<file path=ppt/slides/slide3.xml><?xml version="1.0" encoding="utf-8"?>
+<p:sld xmlns:a="http://schemas.openxmlformats.org/drawingml/2006/main" xmlns:r="http://schemas.openxmlformats.org/officeDocument/2006/relationships" xmlns:p="http://schemas.openxmlformats.org/presentationml/2006/main">
+  <p:cSld>
+    <p:spTree>
+      <p:nvGrpSpPr>
+        <p:cNvPr id="1" name=""/>
+        <p:cNvGrpSpPr/>
+        <p:nvPr/>
+      </p:nvGrpSpPr>
+      <p:grpSpPr>
+        <a:xfrm>
+          <a:off x="0" y="0"/>
+          <a:ext cx="0" cy="0"/>
+          <a:chOff x="0" y="0"/>
+          <a:chExt cx="0" cy="0"/>
+        </a:xfrm>
+      </p:grpSpPr>
+      <p:sp>
+        <p:nvSpPr>
+          <p:cNvPr id="4" name="TextBox 3">
+            <a:extLst>
+              <a:ext uri="{FF2B5EF4-FFF2-40B4-BE49-F238E27FC236}">
+                <a16:creationId xmlns:a16="http://schemas.microsoft.com/office/drawing/2014/main" id="{EDCF9BEC-F37B-46FA-960D-AD06A768DAAE}"/>
+              </a:ext>
+            </a:extLst>
+          </p:cNvPr>
+          <p:cNvSpPr txBox="1"/>
+          <p:nvPr/>
+        </p:nvSpPr>
+        <p:spPr>
+          <a:xfrm>
+            <a:off x="2417428" y="1040235"/>
+            <a:ext cx="1568741" cy="369332"/>
+          </a:xfrm>
+          <a:prstGeom prst="rect">
+            <a:avLst/>
+          </a:prstGeom>
+          <a:noFill/>
+        </p:spPr>
+        <p:txBody>
+          <a:bodyPr wrap="square" rtlCol="0">
+            <a:spAutoFit/>
+          </a:bodyPr>
+          <a:lstStyle/>
+          <a:p>
+            <a:r>
+              <a:rPr lang="en-CA" dirty="0"/>
+              <a:t>Pre-operative</a:t>
+            </a:r>
+          </a:p>
+        </p:txBody>
+      </p:sp>
+      <p:sp>
+        <p:nvSpPr>
+          <p:cNvPr id="6" name="TextBox 5">
+            <a:extLst>
+              <a:ext uri="{FF2B5EF4-FFF2-40B4-BE49-F238E27FC236}">
+                <a16:creationId xmlns:a16="http://schemas.microsoft.com/office/drawing/2014/main" id="{FA8B02E8-829F-4A2C-9EDD-3667D6E325DA}"/>
+              </a:ext>
+            </a:extLst>
+          </p:cNvPr>
+          <p:cNvSpPr txBox="1"/>
+          <p:nvPr/>
+        </p:nvSpPr>
+        <p:spPr>
+          <a:xfrm>
+            <a:off x="8205831" y="1040235"/>
+            <a:ext cx="1568741" cy="369332"/>
+          </a:xfrm>
+          <a:prstGeom prst="rect">
+            <a:avLst/>
+          </a:prstGeom>
+          <a:noFill/>
+        </p:spPr>
+        <p:txBody>
+          <a:bodyPr wrap="square" rtlCol="0">
+            <a:spAutoFit/>
+          </a:bodyPr>
+          <a:lstStyle/>
+          <a:p>
+            <a:r>
+              <a:rPr lang="en-CA" dirty="0"/>
+              <a:t>Peri-operative</a:t>
+            </a:r>
+          </a:p>
+        </p:txBody>
+      </p:sp>
+      <p:cxnSp>
+        <p:nvCxnSpPr>
+          <p:cNvPr id="8" name="Straight Connector 7">
+            <a:extLst>
+              <a:ext uri="{FF2B5EF4-FFF2-40B4-BE49-F238E27FC236}">
+                <a16:creationId xmlns:a16="http://schemas.microsoft.com/office/drawing/2014/main" id="{21BDA15D-9C47-427C-9D62-F9A10D280120}"/>
+              </a:ext>
+            </a:extLst>
+          </p:cNvPr>
+          <p:cNvCxnSpPr/>
+          <p:nvPr/>
+        </p:nvCxnSpPr>
+        <p:spPr>
+          <a:xfrm>
+            <a:off x="6096000" y="0"/>
+            <a:ext cx="0" cy="6858000"/>
+          </a:xfrm>
+          <a:prstGeom prst="line">
+            <a:avLst/>
+          </a:prstGeom>
+          <a:ln w="9525" cap="flat" cmpd="sng" algn="ctr">
+            <a:solidFill>
+              <a:schemeClr val="dk1"/>
+            </a:solidFill>
+            <a:prstDash val="dash"/>
+            <a:round/>
+            <a:headEnd type="none" w="med" len="med"/>
+            <a:tailEnd type="none" w="med" len="med"/>
+          </a:ln>
+        </p:spPr>
+        <p:style>
+          <a:lnRef idx="0">
+            <a:scrgbClr r="0" g="0" b="0"/>
+          </a:lnRef>
+          <a:fillRef idx="0">
+            <a:scrgbClr r="0" g="0" b="0"/>
+          </a:fillRef>
+          <a:effectRef idx="0">
+            <a:scrgbClr r="0" g="0" b="0"/>
+          </a:effectRef>
+          <a:fontRef idx="minor">
+            <a:schemeClr val="tx1"/>
+          </a:fontRef>
+        </p:style>
+      </p:cxnSp>
+      <p:sp>
+        <p:nvSpPr>
+          <p:cNvPr id="9" name="TextBox 8">
+            <a:extLst>
+              <a:ext uri="{FF2B5EF4-FFF2-40B4-BE49-F238E27FC236}">
+                <a16:creationId xmlns:a16="http://schemas.microsoft.com/office/drawing/2014/main" id="{AA86DC4A-6D3E-4838-AD58-AA368D0E81AD}"/>
+              </a:ext>
+            </a:extLst>
+          </p:cNvPr>
+          <p:cNvSpPr txBox="1"/>
+          <p:nvPr/>
+        </p:nvSpPr>
+        <p:spPr>
+          <a:xfrm>
+            <a:off x="426539" y="3337199"/>
+            <a:ext cx="1283715" cy="307777"/>
+          </a:xfrm>
+          <a:prstGeom prst="rect">
+            <a:avLst/>
+          </a:prstGeom>
+          <a:noFill/>
+        </p:spPr>
+        <p:txBody>
+          <a:bodyPr wrap="square" rtlCol="0">
+            <a:spAutoFit/>
+          </a:bodyPr>
+          <a:lstStyle/>
+          <a:p>
+            <a:r>
+              <a:rPr lang="en-CA" sz="1400" dirty="0"/>
+              <a:t>Optical Tracker</a:t>
+            </a:r>
+          </a:p>
+        </p:txBody>
+      </p:sp>
+      <p:sp>
+        <p:nvSpPr>
+          <p:cNvPr id="11" name="TextBox 10">
+            <a:extLst>
+              <a:ext uri="{FF2B5EF4-FFF2-40B4-BE49-F238E27FC236}">
+                <a16:creationId xmlns:a16="http://schemas.microsoft.com/office/drawing/2014/main" id="{BEE728EE-ACD2-458B-911D-7B5BE6E7E8B0}"/>
+              </a:ext>
+            </a:extLst>
+          </p:cNvPr>
+          <p:cNvSpPr txBox="1"/>
+          <p:nvPr/>
+        </p:nvSpPr>
+        <p:spPr>
+          <a:xfrm>
+            <a:off x="10481746" y="3337199"/>
+            <a:ext cx="1283715" cy="307777"/>
+          </a:xfrm>
+          <a:prstGeom prst="rect">
+            <a:avLst/>
+          </a:prstGeom>
+          <a:noFill/>
+        </p:spPr>
+        <p:txBody>
+          <a:bodyPr wrap="square" rtlCol="0">
+            <a:spAutoFit/>
+          </a:bodyPr>
+          <a:lstStyle/>
+          <a:p>
+            <a:r>
+              <a:rPr lang="en-CA" sz="1400" dirty="0"/>
+              <a:t>Optical Tracker</a:t>
+            </a:r>
+          </a:p>
+        </p:txBody>
+      </p:sp>
+      <p:sp>
+        <p:nvSpPr>
+          <p:cNvPr id="13" name="TextBox 12">
+            <a:extLst>
+              <a:ext uri="{FF2B5EF4-FFF2-40B4-BE49-F238E27FC236}">
+                <a16:creationId xmlns:a16="http://schemas.microsoft.com/office/drawing/2014/main" id="{392DB064-8332-4D84-8F88-844BF43DD55A}"/>
+              </a:ext>
+            </a:extLst>
+          </p:cNvPr>
+          <p:cNvSpPr txBox="1"/>
+          <p:nvPr/>
+        </p:nvSpPr>
+        <p:spPr>
+          <a:xfrm>
+            <a:off x="1461080" y="1821469"/>
+            <a:ext cx="1283715" cy="307777"/>
+          </a:xfrm>
+          <a:prstGeom prst="rect">
+            <a:avLst/>
+          </a:prstGeom>
+          <a:noFill/>
+        </p:spPr>
+        <p:txBody>
+          <a:bodyPr wrap="square" rtlCol="0">
+            <a:spAutoFit/>
+          </a:bodyPr>
+          <a:lstStyle/>
+          <a:p>
+            <a:r>
+              <a:rPr lang="en-CA" sz="1400" dirty="0"/>
+              <a:t>3D US Probe</a:t>
+            </a:r>
+          </a:p>
+        </p:txBody>
+      </p:sp>
+      <p:sp>
+        <p:nvSpPr>
+          <p:cNvPr id="15" name="TextBox 14">
+            <a:extLst>
+              <a:ext uri="{FF2B5EF4-FFF2-40B4-BE49-F238E27FC236}">
+                <a16:creationId xmlns:a16="http://schemas.microsoft.com/office/drawing/2014/main" id="{3924F1C2-A083-4755-B7CB-310E88400B36}"/>
+              </a:ext>
+            </a:extLst>
+          </p:cNvPr>
+          <p:cNvSpPr txBox="1"/>
+          <p:nvPr/>
+        </p:nvSpPr>
+        <p:spPr>
+          <a:xfrm>
+            <a:off x="9447205" y="1821469"/>
+            <a:ext cx="1283715" cy="307777"/>
+          </a:xfrm>
+          <a:prstGeom prst="rect">
+            <a:avLst/>
+          </a:prstGeom>
+          <a:noFill/>
+        </p:spPr>
+        <p:txBody>
+          <a:bodyPr wrap="square" rtlCol="0">
+            <a:spAutoFit/>
+          </a:bodyPr>
+          <a:lstStyle/>
+          <a:p>
+            <a:r>
+              <a:rPr lang="en-CA" sz="1400" dirty="0"/>
+              <a:t>3D US Probe</a:t>
+            </a:r>
+          </a:p>
+        </p:txBody>
+      </p:sp>
+      <p:sp>
+        <p:nvSpPr>
+          <p:cNvPr id="17" name="TextBox 16">
+            <a:extLst>
+              <a:ext uri="{FF2B5EF4-FFF2-40B4-BE49-F238E27FC236}">
+                <a16:creationId xmlns:a16="http://schemas.microsoft.com/office/drawing/2014/main" id="{DA570E54-292C-415B-A534-104FEB2343EB}"/>
+              </a:ext>
+            </a:extLst>
+          </p:cNvPr>
+          <p:cNvSpPr txBox="1"/>
+          <p:nvPr/>
+        </p:nvSpPr>
+        <p:spPr>
+          <a:xfrm>
+            <a:off x="3903036" y="1821469"/>
+            <a:ext cx="2145864" cy="307777"/>
+          </a:xfrm>
+          <a:prstGeom prst="rect">
+            <a:avLst/>
+          </a:prstGeom>
+          <a:noFill/>
+        </p:spPr>
+        <p:txBody>
+          <a:bodyPr wrap="square" rtlCol="0">
+            <a:spAutoFit/>
+          </a:bodyPr>
+          <a:lstStyle/>
+          <a:p>
+            <a:r>
+              <a:rPr lang="en-CA" sz="1400" dirty="0"/>
+              <a:t>Pre-operative 3D US Scan</a:t>
+            </a:r>
+          </a:p>
+        </p:txBody>
+      </p:sp>
+      <p:sp>
+        <p:nvSpPr>
+          <p:cNvPr id="19" name="TextBox 18">
+            <a:extLst>
+              <a:ext uri="{FF2B5EF4-FFF2-40B4-BE49-F238E27FC236}">
+                <a16:creationId xmlns:a16="http://schemas.microsoft.com/office/drawing/2014/main" id="{0FAA4D58-E5EA-4D7D-8D9D-0BCEC0793122}"/>
+              </a:ext>
+            </a:extLst>
+          </p:cNvPr>
+          <p:cNvSpPr txBox="1"/>
+          <p:nvPr/>
+        </p:nvSpPr>
+        <p:spPr>
+          <a:xfrm>
+            <a:off x="6561112" y="1822847"/>
+            <a:ext cx="1729449" cy="307777"/>
+          </a:xfrm>
+          <a:prstGeom prst="rect">
+            <a:avLst/>
+          </a:prstGeom>
+          <a:noFill/>
+        </p:spPr>
+        <p:txBody>
+          <a:bodyPr wrap="square" rtlCol="0">
+            <a:spAutoFit/>
+          </a:bodyPr>
+          <a:lstStyle/>
+          <a:p>
+            <a:r>
+              <a:rPr lang="en-CA" sz="1400" dirty="0"/>
+              <a:t>Real-time 3D US Scan</a:t>
+            </a:r>
+          </a:p>
+        </p:txBody>
+      </p:sp>
+      <p:sp>
+        <p:nvSpPr>
+          <p:cNvPr id="21" name="TextBox 20">
+            <a:extLst>
+              <a:ext uri="{FF2B5EF4-FFF2-40B4-BE49-F238E27FC236}">
+                <a16:creationId xmlns:a16="http://schemas.microsoft.com/office/drawing/2014/main" id="{61A8CF98-0C1E-4640-9ED2-74389D0F6EF7}"/>
+              </a:ext>
+            </a:extLst>
+          </p:cNvPr>
+          <p:cNvSpPr txBox="1"/>
+          <p:nvPr/>
+        </p:nvSpPr>
+        <p:spPr>
+          <a:xfrm>
+            <a:off x="3986169" y="4852928"/>
+            <a:ext cx="2145864" cy="307777"/>
+          </a:xfrm>
+          <a:prstGeom prst="rect">
+            <a:avLst/>
+          </a:prstGeom>
+          <a:noFill/>
+        </p:spPr>
+        <p:txBody>
+          <a:bodyPr wrap="square" rtlCol="0">
+            <a:spAutoFit/>
+          </a:bodyPr>
+          <a:lstStyle/>
+          <a:p>
+            <a:r>
+              <a:rPr lang="en-CA" sz="1400" dirty="0"/>
+              <a:t>Tomographic Scan</a:t>
+            </a:r>
+          </a:p>
+        </p:txBody>
+      </p:sp>
+      <p:sp>
+        <p:nvSpPr>
+          <p:cNvPr id="23" name="TextBox 22">
+            <a:extLst>
+              <a:ext uri="{FF2B5EF4-FFF2-40B4-BE49-F238E27FC236}">
+                <a16:creationId xmlns:a16="http://schemas.microsoft.com/office/drawing/2014/main" id="{117C4579-2EAA-45EF-A188-A522BC34F36A}"/>
+              </a:ext>
+            </a:extLst>
+          </p:cNvPr>
+          <p:cNvSpPr txBox="1"/>
+          <p:nvPr/>
+        </p:nvSpPr>
+        <p:spPr>
+          <a:xfrm>
+            <a:off x="1455927" y="4852929"/>
+            <a:ext cx="2145864" cy="307777"/>
+          </a:xfrm>
+          <a:prstGeom prst="rect">
+            <a:avLst/>
+          </a:prstGeom>
+          <a:noFill/>
+        </p:spPr>
+        <p:txBody>
+          <a:bodyPr wrap="square" rtlCol="0">
+            <a:spAutoFit/>
+          </a:bodyPr>
+          <a:lstStyle/>
+          <a:p>
+            <a:r>
+              <a:rPr lang="en-CA" sz="1400" dirty="0"/>
+              <a:t>Tomographic Modality</a:t>
+            </a:r>
+          </a:p>
+        </p:txBody>
+      </p:sp>
+    </p:spTree>
+    <p:extLst>
+      <p:ext uri="{BB962C8B-B14F-4D97-AF65-F5344CB8AC3E}">
+        <p14:creationId xmlns:p14="http://schemas.microsoft.com/office/powerpoint/2010/main" val="1927247662"/>
+      </p:ext>
+    </p:extLst>
+  </p:cSld>
+  <p:clrMapOvr>
+    <a:masterClrMapping/>
+  </p:clrMapOvr>
+</p:sld>
+</file>
+
 <file path=ppt/theme/theme1.xml><?xml version="1.0" encoding="utf-8"?>
 <a:theme xmlns:a="http://schemas.openxmlformats.org/drawingml/2006/main" name="Office Theme">
   <a:themeElements>

</xml_diff>